<commit_message>
Final touch-ups before the seminar
</commit_message>
<xml_diff>
--- a/Plotly for grad school.pptx
+++ b/Plotly for grad school.pptx
@@ -4023,7 +4023,7 @@
           <a:p>
             <a:fld id="{AF869721-F543-4A6C-BF9D-65D7CC540427}" type="datetimeFigureOut">
               <a:rPr lang="en-US" smtClean="0"/>
-              <a:t>10/7/2024</a:t>
+              <a:t>10/13/2024</a:t>
             </a:fld>
             <a:endParaRPr lang="en-US" dirty="0"/>
           </a:p>
@@ -4200,7 +4200,7 @@
           <a:p>
             <a:fld id="{C732326A-4C88-4AFB-AA5B-5919D81DFF5B}" type="datetimeFigureOut">
               <a:rPr lang="en-US" smtClean="0"/>
-              <a:t>10/7/2024</a:t>
+              <a:t>10/13/2024</a:t>
             </a:fld>
             <a:endParaRPr lang="en-US" dirty="0"/>
           </a:p>
@@ -4965,7 +4965,7 @@
             <a:fld id="{B61BEF0D-F0BB-DE4B-95CE-6DB70DBA9567}" type="datetimeFigureOut">
               <a:rPr lang="en-US" smtClean="0"/>
               <a:pPr/>
-              <a:t>10/7/2024</a:t>
+              <a:t>10/13/2024</a:t>
             </a:fld>
             <a:endParaRPr lang="en-US" dirty="0"/>
           </a:p>
@@ -5229,7 +5229,7 @@
             <a:fld id="{B61BEF0D-F0BB-DE4B-95CE-6DB70DBA9567}" type="datetimeFigureOut">
               <a:rPr lang="en-US" smtClean="0"/>
               <a:pPr/>
-              <a:t>10/7/2024</a:t>
+              <a:t>10/13/2024</a:t>
             </a:fld>
             <a:endParaRPr lang="en-US" dirty="0"/>
           </a:p>
@@ -5466,7 +5466,7 @@
             <a:fld id="{B61BEF0D-F0BB-DE4B-95CE-6DB70DBA9567}" type="datetimeFigureOut">
               <a:rPr lang="en-US" smtClean="0"/>
               <a:pPr/>
-              <a:t>10/7/2024</a:t>
+              <a:t>10/13/2024</a:t>
             </a:fld>
             <a:endParaRPr lang="en-US" dirty="0"/>
           </a:p>
@@ -5708,7 +5708,7 @@
             <a:fld id="{B61BEF0D-F0BB-DE4B-95CE-6DB70DBA9567}" type="datetimeFigureOut">
               <a:rPr lang="en-US" smtClean="0"/>
               <a:pPr/>
-              <a:t>10/7/2024</a:t>
+              <a:t>10/13/2024</a:t>
             </a:fld>
             <a:endParaRPr lang="en-US" dirty="0"/>
           </a:p>
@@ -6017,7 +6017,7 @@
             <a:fld id="{B61BEF0D-F0BB-DE4B-95CE-6DB70DBA9567}" type="datetimeFigureOut">
               <a:rPr lang="en-US" smtClean="0"/>
               <a:pPr/>
-              <a:t>10/7/2024</a:t>
+              <a:t>10/13/2024</a:t>
             </a:fld>
             <a:endParaRPr lang="en-US" dirty="0"/>
           </a:p>
@@ -6321,7 +6321,7 @@
             <a:fld id="{B61BEF0D-F0BB-DE4B-95CE-6DB70DBA9567}" type="datetimeFigureOut">
               <a:rPr lang="en-US" smtClean="0"/>
               <a:pPr/>
-              <a:t>10/7/2024</a:t>
+              <a:t>10/13/2024</a:t>
             </a:fld>
             <a:endParaRPr lang="en-US" dirty="0"/>
           </a:p>
@@ -6745,7 +6745,7 @@
             <a:fld id="{B61BEF0D-F0BB-DE4B-95CE-6DB70DBA9567}" type="datetimeFigureOut">
               <a:rPr lang="en-US" smtClean="0"/>
               <a:pPr/>
-              <a:t>10/7/2024</a:t>
+              <a:t>10/13/2024</a:t>
             </a:fld>
             <a:endParaRPr lang="en-US" dirty="0"/>
           </a:p>
@@ -6842,7 +6842,7 @@
             <a:fld id="{B61BEF0D-F0BB-DE4B-95CE-6DB70DBA9567}" type="datetimeFigureOut">
               <a:rPr lang="en-US" smtClean="0"/>
               <a:pPr/>
-              <a:t>10/7/2024</a:t>
+              <a:t>10/13/2024</a:t>
             </a:fld>
             <a:endParaRPr lang="en-US" dirty="0"/>
           </a:p>
@@ -7006,7 +7006,7 @@
             <a:fld id="{B61BEF0D-F0BB-DE4B-95CE-6DB70DBA9567}" type="datetimeFigureOut">
               <a:rPr lang="en-US" smtClean="0"/>
               <a:pPr/>
-              <a:t>10/7/2024</a:t>
+              <a:t>10/13/2024</a:t>
             </a:fld>
             <a:endParaRPr lang="en-US" dirty="0"/>
           </a:p>
@@ -7386,7 +7386,7 @@
             <a:fld id="{B61BEF0D-F0BB-DE4B-95CE-6DB70DBA9567}" type="datetimeFigureOut">
               <a:rPr lang="en-US" smtClean="0"/>
               <a:pPr/>
-              <a:t>10/7/2024</a:t>
+              <a:t>10/13/2024</a:t>
             </a:fld>
             <a:endParaRPr lang="en-US" dirty="0"/>
           </a:p>
@@ -7677,7 +7677,7 @@
             <a:fld id="{B61BEF0D-F0BB-DE4B-95CE-6DB70DBA9567}" type="datetimeFigureOut">
               <a:rPr lang="en-US" smtClean="0"/>
               <a:pPr/>
-              <a:t>10/7/2024</a:t>
+              <a:t>10/13/2024</a:t>
             </a:fld>
             <a:endParaRPr lang="en-US" dirty="0"/>
           </a:p>
@@ -7890,7 +7890,7 @@
             <a:fld id="{B61BEF0D-F0BB-DE4B-95CE-6DB70DBA9567}" type="datetimeFigureOut">
               <a:rPr lang="en-US" smtClean="0"/>
               <a:pPr/>
-              <a:t>10/7/2024</a:t>
+              <a:t>10/13/2024</a:t>
             </a:fld>
             <a:endParaRPr lang="en-US" dirty="0"/>
           </a:p>
@@ -9062,13 +9062,24 @@
           <a:p>
             <a:r>
               <a:rPr lang="en-US" dirty="0"/>
-              <a:t>Graduated in May with my Master’s from UofL </a:t>
+              <a:t>Undergraduate degree in </a:t>
             </a:r>
+            <a:r>
+              <a:rPr lang="en-US" dirty="0" err="1"/>
+              <a:t>CS+Physics</a:t>
+            </a:r>
+            <a:endParaRPr lang="en-US" dirty="0"/>
           </a:p>
           <a:p>
             <a:r>
               <a:rPr lang="en-US" dirty="0"/>
-              <a:t>Senior Computational Biology Software Engineer at </a:t>
+              <a:t>Graduated with my Master’s from UofL in May </a:t>
+            </a:r>
+          </a:p>
+          <a:p>
+            <a:r>
+              <a:rPr lang="en-US" dirty="0"/>
+              <a:t>Currently a Senior Computational Biology Software Engineer at </a:t>
             </a:r>
             <a:r>
               <a:rPr lang="en-US" sz="1800" dirty="0"/>
@@ -9174,40 +9185,9 @@
               <a:rPr lang="en-US" i="1" dirty="0"/>
               <a:t>Reference</a:t>
             </a:r>
-            <a:endParaRPr lang="en-US" i="1" strike="sngStrike" dirty="0"/>
           </a:p>
         </p:txBody>
       </p:sp>
-      <p:pic>
-        <p:nvPicPr>
-          <p:cNvPr id="7" name="Picture 6" descr="A person in a suit smiling&#10;&#10;Description automatically generated">
-            <a:extLst>
-              <a:ext uri="{FF2B5EF4-FFF2-40B4-BE49-F238E27FC236}">
-                <a16:creationId xmlns:a16="http://schemas.microsoft.com/office/drawing/2014/main" id="{EA4E24A2-3E9B-154D-2DA8-3FFD3D4D7A2C}"/>
-              </a:ext>
-            </a:extLst>
-          </p:cNvPr>
-          <p:cNvPicPr>
-            <a:picLocks noChangeAspect="1"/>
-          </p:cNvPicPr>
-          <p:nvPr/>
-        </p:nvPicPr>
-        <p:blipFill rotWithShape="1">
-          <a:blip r:embed="rId2"/>
-          <a:srcRect t="9136" r="2" b="28528"/>
-          <a:stretch/>
-        </p:blipFill>
-        <p:spPr>
-          <a:xfrm>
-            <a:off x="3879577" y="1437682"/>
-            <a:ext cx="1857033" cy="1488370"/>
-          </a:xfrm>
-          <a:prstGeom prst="rect">
-            <a:avLst/>
-          </a:prstGeom>
-          <a:noFill/>
-        </p:spPr>
-      </p:pic>
     </p:spTree>
     <p:extLst>
       <p:ext uri="{BB962C8B-B14F-4D97-AF65-F5344CB8AC3E}">
@@ -11137,6 +11117,15 @@
 </file>
 
 <file path=customXml/item2.xml><?xml version="1.0" encoding="utf-8"?>
+<?mso-contentType ?>
+<FormTemplates xmlns="http://schemas.microsoft.com/sharepoint/v3/contenttype/forms">
+  <Display>DocumentLibraryForm</Display>
+  <Edit>DocumentLibraryForm</Edit>
+  <New>DocumentLibraryForm</New>
+</FormTemplates>
+</file>
+
+<file path=customXml/item3.xml><?xml version="1.0" encoding="utf-8"?>
 <ct:contentTypeSchema xmlns:ct="http://schemas.microsoft.com/office/2006/metadata/contentType" xmlns:ma="http://schemas.microsoft.com/office/2006/metadata/properties/metaAttributes" ct:_="" ma:_="" ma:contentTypeName="Document" ma:contentTypeID="0x01010079F111ED35F8CC479449609E8A0923A6" ma:contentTypeVersion="27" ma:contentTypeDescription="Create a new document." ma:contentTypeScope="" ma:versionID="c6f9a84f66a9c8b9a21755b9ffafb945">
   <xsd:schema xmlns:xsd="http://www.w3.org/2001/XMLSchema" xmlns:xs="http://www.w3.org/2001/XMLSchema" xmlns:p="http://schemas.microsoft.com/office/2006/metadata/properties" xmlns:ns1="http://schemas.microsoft.com/sharepoint/v3" xmlns:ns2="71af3243-3dd4-4a8d-8c0d-dd76da1f02a5" xmlns:ns3="16c05727-aa75-4e4a-9b5f-8a80a1165891" xmlns:ns4="230e9df3-be65-4c73-a93b-d1236ebd677e" targetNamespace="http://schemas.microsoft.com/office/2006/metadata/properties" ma:root="true" ma:fieldsID="27df39e3e7036dff54f89ddd5805ce72" ns1:_="" ns2:_="" ns3:_="" ns4:_="">
     <xsd:import namespace="http://schemas.microsoft.com/sharepoint/v3"/>
@@ -11442,15 +11431,6 @@
 </ct:contentTypeSchema>
 </file>
 
-<file path=customXml/item3.xml><?xml version="1.0" encoding="utf-8"?>
-<?mso-contentType ?>
-<FormTemplates xmlns="http://schemas.microsoft.com/sharepoint/v3/contenttype/forms">
-  <Display>DocumentLibraryForm</Display>
-  <Edit>DocumentLibraryForm</Edit>
-  <New>DocumentLibraryForm</New>
-</FormTemplates>
-</file>
-
 <file path=customXml/itemProps1.xml><?xml version="1.0" encoding="utf-8"?>
 <ds:datastoreItem xmlns:ds="http://schemas.openxmlformats.org/officeDocument/2006/customXml" ds:itemID="{3791575F-4C21-47C4-8D13-EB9BE66B536F}">
   <ds:schemaRefs>
@@ -11464,6 +11444,14 @@
 </file>
 
 <file path=customXml/itemProps2.xml><?xml version="1.0" encoding="utf-8"?>
+<ds:datastoreItem xmlns:ds="http://schemas.openxmlformats.org/officeDocument/2006/customXml" ds:itemID="{342D3C2F-55A5-48C0-9D5A-95C7FF0389D0}">
+  <ds:schemaRefs>
+    <ds:schemaRef ds:uri="http://schemas.microsoft.com/sharepoint/v3/contenttype/forms"/>
+  </ds:schemaRefs>
+</ds:datastoreItem>
+</file>
+
+<file path=customXml/itemProps3.xml><?xml version="1.0" encoding="utf-8"?>
 <ds:datastoreItem xmlns:ds="http://schemas.openxmlformats.org/officeDocument/2006/customXml" ds:itemID="{792209EB-3212-4116-B574-D1F56C7C4922}">
   <ds:schemaRefs>
     <ds:schemaRef ds:uri="http://schemas.microsoft.com/office/2006/metadata/contentType"/>
@@ -11482,12 +11470,4 @@
     <ds:schemaRef ds:uri="http://schemas.microsoft.com/internal/obd"/>
   </ds:schemaRefs>
 </ds:datastoreItem>
-</file>
-
-<file path=customXml/itemProps3.xml><?xml version="1.0" encoding="utf-8"?>
-<ds:datastoreItem xmlns:ds="http://schemas.openxmlformats.org/officeDocument/2006/customXml" ds:itemID="{342D3C2F-55A5-48C0-9D5A-95C7FF0389D0}">
-  <ds:schemaRefs>
-    <ds:schemaRef ds:uri="http://schemas.microsoft.com/sharepoint/v3/contenttype/forms"/>
-  </ds:schemaRefs>
-</ds:datastoreItem>
 </file>
</xml_diff>